<commit_message>
update overview slide to remove outdated BM3 results
</commit_message>
<xml_diff>
--- a/PRISMS-PF Training Intro.pptx
+++ b/PRISMS-PF Training Intro.pptx
@@ -128,7 +128,7 @@
   </p:defaultTextStyle>
   <p:extLst>
     <p:ext uri="{EFAFB233-063F-42B5-8137-9DF3F51BA10A}">
-      <p15:sldGuideLst xmlns:p15="http://schemas.microsoft.com/office/powerpoint/2012/main" xmlns="">
+      <p15:sldGuideLst xmlns="" xmlns:p15="http://schemas.microsoft.com/office/powerpoint/2012/main">
         <p15:guide id="1" orient="horz" pos="2160">
           <p15:clr>
             <a:srgbClr val="A4A3A4"/>
@@ -228,7 +228,7 @@
             <a:fld id="{EDE59739-7EF2-434F-9143-165AE09AC61A}" type="datetimeFigureOut">
               <a:rPr lang="en-US" smtClean="0"/>
               <a:pPr/>
-              <a:t>8/5/18</a:t>
+              <a:t>10/4/18</a:t>
             </a:fld>
             <a:endParaRPr lang="en-US"/>
           </a:p>
@@ -694,7 +694,7 @@
                 <a:latin typeface="Calibri"/>
               </a:rPr>
               <a:pPr/>
-              <a:t>8/5/18</a:t>
+              <a:t>10/4/18</a:t>
             </a:fld>
             <a:endParaRPr lang="en-US">
               <a:solidFill>
@@ -1103,7 +1103,7 @@
                 <a:latin typeface="Calibri"/>
               </a:rPr>
               <a:pPr/>
-              <a:t>8/5/18</a:t>
+              <a:t>10/4/18</a:t>
             </a:fld>
             <a:endParaRPr lang="en-US">
               <a:solidFill>
@@ -1495,7 +1495,7 @@
                 <a:latin typeface="Calibri"/>
               </a:rPr>
               <a:pPr/>
-              <a:t>8/5/18</a:t>
+              <a:t>10/4/18</a:t>
             </a:fld>
             <a:endParaRPr lang="en-US">
               <a:solidFill>
@@ -1824,7 +1824,7 @@
                 <a:latin typeface="Calibri"/>
               </a:rPr>
               <a:pPr defTabSz="914400"/>
-              <a:t>8/5/18</a:t>
+              <a:t>10/4/18</a:t>
             </a:fld>
             <a:endParaRPr lang="en-US">
               <a:solidFill>
@@ -2187,7 +2187,7 @@
                 <a:latin typeface="Calibri"/>
               </a:rPr>
               <a:pPr/>
-              <a:t>8/5/18</a:t>
+              <a:t>10/4/18</a:t>
             </a:fld>
             <a:endParaRPr lang="en-US">
               <a:solidFill>
@@ -2645,7 +2645,7 @@
                 <a:latin typeface="Calibri"/>
               </a:rPr>
               <a:pPr/>
-              <a:t>8/5/18</a:t>
+              <a:t>10/4/18</a:t>
             </a:fld>
             <a:endParaRPr lang="en-US">
               <a:solidFill>
@@ -3145,7 +3145,7 @@
                 <a:latin typeface="Calibri"/>
               </a:rPr>
               <a:pPr/>
-              <a:t>8/5/18</a:t>
+              <a:t>10/4/18</a:t>
             </a:fld>
             <a:endParaRPr lang="en-US">
               <a:solidFill>
@@ -3779,7 +3779,7 @@
                 <a:latin typeface="Calibri"/>
               </a:rPr>
               <a:pPr/>
-              <a:t>8/5/18</a:t>
+              <a:t>10/4/18</a:t>
             </a:fld>
             <a:endParaRPr lang="en-US">
               <a:solidFill>
@@ -4109,7 +4109,7 @@
                 <a:latin typeface="Calibri"/>
               </a:rPr>
               <a:pPr/>
-              <a:t>8/5/18</a:t>
+              <a:t>10/4/18</a:t>
             </a:fld>
             <a:endParaRPr lang="en-US">
               <a:solidFill>
@@ -4416,7 +4416,7 @@
                 <a:latin typeface="Calibri"/>
               </a:rPr>
               <a:pPr/>
-              <a:t>8/5/18</a:t>
+              <a:t>10/4/18</a:t>
             </a:fld>
             <a:endParaRPr lang="en-US">
               <a:solidFill>
@@ -4905,7 +4905,7 @@
                 <a:latin typeface="Calibri"/>
               </a:rPr>
               <a:pPr/>
-              <a:t>8/5/18</a:t>
+              <a:t>10/4/18</a:t>
             </a:fld>
             <a:endParaRPr lang="en-US">
               <a:solidFill>
@@ -5370,7 +5370,7 @@
                 <a:latin typeface="Calibri"/>
               </a:rPr>
               <a:pPr/>
-              <a:t>8/5/18</a:t>
+              <a:t>10/4/18</a:t>
             </a:fld>
             <a:endParaRPr lang="en-US">
               <a:solidFill>
@@ -10428,12 +10428,12 @@
           <a:graphicData uri="http://schemas.openxmlformats.org/presentationml/2006/ole">
             <mc:AlternateContent xmlns:mc="http://schemas.openxmlformats.org/markup-compatibility/2006">
               <mc:Choice xmlns:v="urn:schemas-microsoft-com:vml" Requires="v">
-                <p:oleObj spid="_x0000_s1070" name="Document" r:id="rId3" imgW="5486400" imgH="381000" progId="Word.Document.12">
+                <p:oleObj spid="_x0000_s1073" name="Document" r:id="rId4" imgW="5486400" imgH="381000" progId="Word.Document.12">
                   <p:embed/>
                 </p:oleObj>
               </mc:Choice>
               <mc:Fallback>
-                <p:oleObj name="Document" r:id="rId3" imgW="5486400" imgH="381000" progId="Word.Document.12">
+                <p:oleObj name="Document" r:id="rId4" imgW="5486400" imgH="381000" progId="Word.Document.12">
                   <p:embed/>
                   <p:pic>
                     <p:nvPicPr>
@@ -10442,7 +10442,7 @@
                       <p:nvPr/>
                     </p:nvPicPr>
                     <p:blipFill>
-                      <a:blip r:embed="rId4"/>
+                      <a:blip r:embed="rId5"/>
                       <a:stretch>
                         <a:fillRect/>
                       </a:stretch>
@@ -10485,12 +10485,12 @@
           <a:graphicData uri="http://schemas.openxmlformats.org/presentationml/2006/ole">
             <mc:AlternateContent xmlns:mc="http://schemas.openxmlformats.org/markup-compatibility/2006">
               <mc:Choice xmlns:v="urn:schemas-microsoft-com:vml" Requires="v">
-                <p:oleObj spid="_x0000_s1071" name="Document" r:id="rId5" imgW="5486400" imgH="469900" progId="Word.Document.12">
+                <p:oleObj spid="_x0000_s1074" name="Document" r:id="rId7" imgW="5486400" imgH="469900" progId="Word.Document.12">
                   <p:embed/>
                 </p:oleObj>
               </mc:Choice>
               <mc:Fallback>
-                <p:oleObj name="Document" r:id="rId5" imgW="5486400" imgH="469900" progId="Word.Document.12">
+                <p:oleObj name="Document" r:id="rId7" imgW="5486400" imgH="469900" progId="Word.Document.12">
                   <p:embed/>
                   <p:pic>
                     <p:nvPicPr>
@@ -10499,7 +10499,7 @@
                       <p:nvPr/>
                     </p:nvPicPr>
                     <p:blipFill>
-                      <a:blip r:embed="rId6"/>
+                      <a:blip r:embed="rId8"/>
                       <a:stretch>
                         <a:fillRect/>
                       </a:stretch>
@@ -10605,7 +10605,7 @@
           <p:nvPr/>
         </p:nvPicPr>
         <p:blipFill>
-          <a:blip r:embed="rId7">
+          <a:blip r:embed="rId9">
             <a:extLst>
               <a:ext uri="{28A0092B-C50C-407E-A947-70E740481C1C}">
                 <a14:useLocalDpi xmlns:a14="http://schemas.microsoft.com/office/drawing/2010/main" val="0"/>
@@ -11700,23 +11700,21 @@
             </a:r>
             <a:r>
               <a:rPr lang="en-US" dirty="0"/>
-              <a:t>with finite difference (even without adaptive meshing</a:t>
+              <a:t>with finite difference </a:t>
             </a:r>
             <a:r>
               <a:rPr lang="en-US" dirty="0" smtClean="0"/>
-              <a:t>)</a:t>
-            </a:r>
+              <a:t>(10x without adaptive meshing, 100x with adaptive meshing)</a:t>
+            </a:r>
+            <a:endParaRPr lang="en-US" dirty="0"/>
           </a:p>
           <a:p>
             <a:pPr algn="ctr"/>
-            <a:endParaRPr lang="en-US" sz="500" dirty="0" smtClean="0"/>
+            <a:endParaRPr lang="en-US" dirty="0" smtClean="0"/>
           </a:p>
           <a:p>
             <a:pPr algn="ctr"/>
-            <a:r>
-              <a:rPr lang="en-US" dirty="0" smtClean="0"/>
-              <a:t>More than 100x faster than MOOSE and FiPy for solidification benchmark problem</a:t>
-            </a:r>
+            <a:endParaRPr lang="en-US" dirty="0"/>
           </a:p>
           <a:p>
             <a:pPr algn="ctr"/>
@@ -12097,12 +12095,12 @@
           <a:graphicData uri="http://schemas.openxmlformats.org/presentationml/2006/ole">
             <mc:AlternateContent xmlns:mc="http://schemas.openxmlformats.org/markup-compatibility/2006">
               <mc:Choice xmlns:v="urn:schemas-microsoft-com:vml" Requires="v">
-                <p:oleObj spid="_x0000_s2053" name="Document" r:id="rId3" imgW="5638800" imgH="2362200" progId="Word.Document.12">
+                <p:oleObj spid="_x0000_s2055" name="Document" r:id="rId4" imgW="5638800" imgH="2362200" progId="Word.Document.12">
                   <p:embed/>
                 </p:oleObj>
               </mc:Choice>
               <mc:Fallback>
-                <p:oleObj name="Document" r:id="rId3" imgW="5638800" imgH="2362200" progId="Word.Document.12">
+                <p:oleObj name="Document" r:id="rId4" imgW="5638800" imgH="2362200" progId="Word.Document.12">
                   <p:embed/>
                   <p:pic>
                     <p:nvPicPr>
@@ -12111,7 +12109,7 @@
                       <p:nvPr/>
                     </p:nvPicPr>
                     <p:blipFill>
-                      <a:blip r:embed="rId4"/>
+                      <a:blip r:embed="rId5"/>
                       <a:stretch>
                         <a:fillRect/>
                       </a:stretch>

</xml_diff>